<commit_message>
modified:   collision.py 	modified:   freeProduction.pptx
</commit_message>
<xml_diff>
--- a/freeProduction.pptx
+++ b/freeProduction.pptx
@@ -10,6 +10,9 @@
     <p:sldId id="259" r:id="rId4"/>
     <p:sldId id="258" r:id="rId5"/>
     <p:sldId id="260" r:id="rId6"/>
+    <p:sldId id="261" r:id="rId7"/>
+    <p:sldId id="262" r:id="rId8"/>
+    <p:sldId id="263" r:id="rId9"/>
   </p:sldIdLst>
   <p:sldSz cx="12192000" cy="6858000"/>
   <p:notesSz cx="6858000" cy="9144000"/>
@@ -109,6 +112,34 @@
     </a:lvl9pPr>
   </p:defaultTextStyle>
   <p:extLst>
+    <p:ext uri="{521415D9-36F7-43E2-AB2F-B90AF26B5E84}">
+      <p14:sectionLst xmlns:p14="http://schemas.microsoft.com/office/powerpoint/2010/main">
+        <p14:section name="導入" id="{E46BC011-15E0-48B5-842D-6DEF7B6893FB}">
+          <p14:sldIdLst>
+            <p14:sldId id="256"/>
+            <p14:sldId id="257"/>
+          </p14:sldIdLst>
+        </p14:section>
+        <p14:section name="操作方法" id="{97B7C01D-6B0E-4312-9624-C1544CE92E2D}">
+          <p14:sldIdLst>
+            <p14:sldId id="259"/>
+            <p14:sldId id="258"/>
+          </p14:sldIdLst>
+        </p14:section>
+        <p14:section name="プログラム構成" id="{0D5D7E64-CC05-4E83-B92F-5B734D3AC24D}">
+          <p14:sldIdLst>
+            <p14:sldId id="260"/>
+          </p14:sldIdLst>
+        </p14:section>
+        <p14:section name="まとめ" id="{2576E5FA-7590-478D-9628-DDC85974476E}">
+          <p14:sldIdLst>
+            <p14:sldId id="261"/>
+            <p14:sldId id="262"/>
+            <p14:sldId id="263"/>
+          </p14:sldIdLst>
+        </p14:section>
+      </p14:sectionLst>
+    </p:ext>
     <p:ext uri="{EFAFB233-063F-42B5-8137-9DF3F51BA10A}">
       <p15:sldGuideLst xmlns:p15="http://schemas.microsoft.com/office/powerpoint/2012/main"/>
     </p:ext>
@@ -301,7 +332,7 @@
           <a:p>
             <a:fld id="{88D38747-4367-4BD2-8D51-C97E202738E2}" type="datetime1">
               <a:rPr lang="en-US" smtClean="0"/>
-              <a:t>12/9/2019</a:t>
+              <a:t>1/26/2020</a:t>
             </a:fld>
             <a:endParaRPr lang="en-US" dirty="0"/>
           </a:p>
@@ -606,7 +637,7 @@
           <a:p>
             <a:fld id="{11F1B079-7EF0-44EE-B798-BCC497C9F3B2}" type="datetime1">
               <a:rPr lang="en-US" smtClean="0"/>
-              <a:t>12/9/2019</a:t>
+              <a:t>1/26/2020</a:t>
             </a:fld>
             <a:endParaRPr lang="en-US" dirty="0"/>
           </a:p>
@@ -800,7 +831,7 @@
           <a:p>
             <a:fld id="{28FF70A8-1D13-4657-95F0-A9EA54967B8D}" type="datetime1">
               <a:rPr lang="en-US" smtClean="0"/>
-              <a:t>12/9/2019</a:t>
+              <a:t>1/26/2020</a:t>
             </a:fld>
             <a:endParaRPr lang="en-US" dirty="0"/>
           </a:p>
@@ -1063,7 +1094,7 @@
           <a:p>
             <a:fld id="{21EB90AC-71BD-4C7F-8ACA-7B3F18292E63}" type="datetime1">
               <a:rPr lang="en-US" smtClean="0"/>
-              <a:t>12/9/2019</a:t>
+              <a:t>1/26/2020</a:t>
             </a:fld>
             <a:endParaRPr lang="en-US" dirty="0"/>
           </a:p>
@@ -1499,7 +1530,7 @@
           <a:p>
             <a:fld id="{4E6EFC2C-8905-46F0-B443-CE905B76BA01}" type="datetime1">
               <a:rPr lang="en-US" smtClean="0"/>
-              <a:t>12/9/2019</a:t>
+              <a:t>1/26/2020</a:t>
             </a:fld>
             <a:endParaRPr lang="en-US" dirty="0"/>
           </a:p>
@@ -2036,7 +2067,7 @@
           <a:p>
             <a:fld id="{D9079DC3-C9B5-499E-9140-0DC28B7074E2}" type="datetime1">
               <a:rPr lang="en-US" smtClean="0"/>
-              <a:t>12/9/2019</a:t>
+              <a:t>1/26/2020</a:t>
             </a:fld>
             <a:endParaRPr lang="en-US" dirty="0"/>
           </a:p>
@@ -2918,7 +2949,7 @@
           <a:p>
             <a:fld id="{30BB33EA-E472-4D22-9C03-A9C14AA21CED}" type="datetime1">
               <a:rPr lang="en-US" smtClean="0"/>
-              <a:t>12/9/2019</a:t>
+              <a:t>1/26/2020</a:t>
             </a:fld>
             <a:endParaRPr lang="en-US" dirty="0"/>
           </a:p>
@@ -3088,7 +3119,7 @@
           <a:p>
             <a:fld id="{217E833E-1B6D-415F-AD29-75AE8C43BD0D}" type="datetime1">
               <a:rPr lang="en-US" smtClean="0"/>
-              <a:t>12/9/2019</a:t>
+              <a:t>1/26/2020</a:t>
             </a:fld>
             <a:endParaRPr lang="en-US" dirty="0"/>
           </a:p>
@@ -3272,7 +3303,7 @@
           <a:p>
             <a:fld id="{8452596F-08A7-4B70-989A-F2B1CF31E66B}" type="datetime1">
               <a:rPr lang="en-US" smtClean="0"/>
-              <a:t>12/9/2019</a:t>
+              <a:t>1/26/2020</a:t>
             </a:fld>
             <a:endParaRPr lang="en-US" dirty="0"/>
           </a:p>
@@ -3442,7 +3473,7 @@
           <a:p>
             <a:fld id="{73C55A3C-5767-4844-A0A3-83778C2E5409}" type="datetime1">
               <a:rPr lang="en-US" smtClean="0"/>
-              <a:t>12/9/2019</a:t>
+              <a:t>1/26/2020</a:t>
             </a:fld>
             <a:endParaRPr lang="en-US" dirty="0"/>
           </a:p>
@@ -3686,7 +3717,7 @@
           <a:p>
             <a:fld id="{CAE507A8-A5CF-4D38-AB86-7EDDA87A85D4}" type="datetime1">
               <a:rPr lang="en-US" smtClean="0"/>
-              <a:t>12/9/2019</a:t>
+              <a:t>1/26/2020</a:t>
             </a:fld>
             <a:endParaRPr lang="en-US" dirty="0"/>
           </a:p>
@@ -3928,7 +3959,7 @@
           <a:p>
             <a:fld id="{BDFCD27C-8599-43EF-BA1D-14DDC1946E06}" type="datetime1">
               <a:rPr lang="en-US" smtClean="0"/>
-              <a:t>12/9/2019</a:t>
+              <a:t>1/26/2020</a:t>
             </a:fld>
             <a:endParaRPr lang="en-US" dirty="0"/>
           </a:p>
@@ -4409,7 +4440,7 @@
           <a:p>
             <a:fld id="{49343D99-809A-49C0-96E5-4250D0B498EE}" type="datetime1">
               <a:rPr lang="en-US" smtClean="0"/>
-              <a:t>12/9/2019</a:t>
+              <a:t>1/26/2020</a:t>
             </a:fld>
             <a:endParaRPr lang="en-US" dirty="0"/>
           </a:p>
@@ -4527,7 +4558,7 @@
           <a:p>
             <a:fld id="{A143DE9B-B678-4EFB-BB7D-A4370204A0B0}" type="datetime1">
               <a:rPr lang="en-US" smtClean="0"/>
-              <a:t>12/9/2019</a:t>
+              <a:t>1/26/2020</a:t>
             </a:fld>
             <a:endParaRPr lang="en-US" dirty="0"/>
           </a:p>
@@ -4622,7 +4653,7 @@
           <a:p>
             <a:fld id="{E68812DA-F765-4142-A6A3-A8ED7235E082}" type="datetime1">
               <a:rPr lang="en-US" smtClean="0"/>
-              <a:t>12/9/2019</a:t>
+              <a:t>1/26/2020</a:t>
             </a:fld>
             <a:endParaRPr lang="en-US" dirty="0"/>
           </a:p>
@@ -4877,7 +4908,7 @@
           <a:p>
             <a:fld id="{3E0277FD-7DE6-41D4-930D-AC99F5AFE54E}" type="datetime1">
               <a:rPr lang="en-US" smtClean="0"/>
-              <a:t>12/9/2019</a:t>
+              <a:t>1/26/2020</a:t>
             </a:fld>
             <a:endParaRPr lang="en-US" dirty="0"/>
           </a:p>
@@ -5184,7 +5215,7 @@
           <a:p>
             <a:fld id="{9EA15526-7079-4B7B-987C-1B5FAE11A0FF}" type="datetime1">
               <a:rPr lang="en-US" smtClean="0"/>
-              <a:t>12/9/2019</a:t>
+              <a:t>1/26/2020</a:t>
             </a:fld>
             <a:endParaRPr lang="en-US" dirty="0"/>
           </a:p>
@@ -5419,7 +5450,7 @@
           <a:p>
             <a:fld id="{073ED0CC-082F-4160-86E5-0D6041F12778}" type="datetime1">
               <a:rPr lang="en-US" smtClean="0"/>
-              <a:t>12/9/2019</a:t>
+              <a:t>1/26/2020</a:t>
             </a:fld>
             <a:endParaRPr lang="en-US" dirty="0"/>
           </a:p>
@@ -6933,7 +6964,12 @@
             <p:ph idx="1"/>
           </p:nvPr>
         </p:nvSpPr>
-        <p:spPr/>
+        <p:spPr>
+          <a:xfrm>
+            <a:off x="913795" y="2067023"/>
+            <a:ext cx="10353762" cy="3714749"/>
+          </a:xfrm>
+        </p:spPr>
         <p:txBody>
           <a:bodyPr>
             <a:normAutofit/>
@@ -6965,6 +7001,313 @@
     <p:extLst>
       <p:ext uri="{BB962C8B-B14F-4D97-AF65-F5344CB8AC3E}">
         <p14:creationId xmlns:p14="http://schemas.microsoft.com/office/powerpoint/2010/main" val="2766128068"/>
+      </p:ext>
+    </p:extLst>
+  </p:cSld>
+  <p:clrMapOvr>
+    <a:masterClrMapping/>
+  </p:clrMapOvr>
+</p:sld>
+</file>
+
+<file path=ppt/slides/slide6.xml><?xml version="1.0" encoding="utf-8"?>
+<p:sld xmlns:a="http://schemas.openxmlformats.org/drawingml/2006/main" xmlns:r="http://schemas.openxmlformats.org/officeDocument/2006/relationships" xmlns:p="http://schemas.openxmlformats.org/presentationml/2006/main">
+  <p:cSld>
+    <p:spTree>
+      <p:nvGrpSpPr>
+        <p:cNvPr id="1" name=""/>
+        <p:cNvGrpSpPr/>
+        <p:nvPr/>
+      </p:nvGrpSpPr>
+      <p:grpSpPr>
+        <a:xfrm>
+          <a:off x="0" y="0"/>
+          <a:ext cx="0" cy="0"/>
+          <a:chOff x="0" y="0"/>
+          <a:chExt cx="0" cy="0"/>
+        </a:xfrm>
+      </p:grpSpPr>
+      <p:sp>
+        <p:nvSpPr>
+          <p:cNvPr id="2" name="タイトル 1">
+            <a:extLst>
+              <a:ext uri="{FF2B5EF4-FFF2-40B4-BE49-F238E27FC236}">
+                <a16:creationId xmlns:a16="http://schemas.microsoft.com/office/drawing/2014/main" id="{ABFCA7CE-07A6-4AFA-84D9-8AE2B30BC94A}"/>
+              </a:ext>
+            </a:extLst>
+          </p:cNvPr>
+          <p:cNvSpPr>
+            <a:spLocks noGrp="1"/>
+          </p:cNvSpPr>
+          <p:nvPr>
+            <p:ph type="title"/>
+          </p:nvPr>
+        </p:nvSpPr>
+        <p:spPr/>
+        <p:txBody>
+          <a:bodyPr/>
+          <a:lstStyle/>
+          <a:p>
+            <a:pPr algn="l"/>
+            <a:r>
+              <a:rPr kumimoji="1" lang="ja-JP" altLang="en-US" dirty="0"/>
+              <a:t>成果</a:t>
+            </a:r>
+          </a:p>
+        </p:txBody>
+      </p:sp>
+      <p:sp>
+        <p:nvSpPr>
+          <p:cNvPr id="3" name="コンテンツ プレースホルダー 2">
+            <a:extLst>
+              <a:ext uri="{FF2B5EF4-FFF2-40B4-BE49-F238E27FC236}">
+                <a16:creationId xmlns:a16="http://schemas.microsoft.com/office/drawing/2014/main" id="{CEC253F6-6C4B-4151-AABD-F5A48FC347DF}"/>
+              </a:ext>
+            </a:extLst>
+          </p:cNvPr>
+          <p:cNvSpPr>
+            <a:spLocks noGrp="1"/>
+          </p:cNvSpPr>
+          <p:nvPr>
+            <p:ph idx="1"/>
+          </p:nvPr>
+        </p:nvSpPr>
+        <p:spPr/>
+        <p:txBody>
+          <a:bodyPr/>
+          <a:lstStyle/>
+          <a:p>
+            <a:r>
+              <a:rPr kumimoji="1" lang="ja-JP" altLang="en-US" dirty="0"/>
+              <a:t>ウォークスルーの実装</a:t>
+            </a:r>
+            <a:endParaRPr kumimoji="1" lang="en-US" altLang="ja-JP" dirty="0"/>
+          </a:p>
+          <a:p>
+            <a:r>
+              <a:rPr kumimoji="1" lang="ja-JP" altLang="en-US" dirty="0"/>
+              <a:t>衝突検出</a:t>
+            </a:r>
+            <a:endParaRPr kumimoji="1" lang="en-US" altLang="ja-JP" dirty="0"/>
+          </a:p>
+          <a:p>
+            <a:endParaRPr kumimoji="1" lang="ja-JP" altLang="en-US" dirty="0"/>
+          </a:p>
+        </p:txBody>
+      </p:sp>
+    </p:spTree>
+    <p:extLst>
+      <p:ext uri="{BB962C8B-B14F-4D97-AF65-F5344CB8AC3E}">
+        <p14:creationId xmlns:p14="http://schemas.microsoft.com/office/powerpoint/2010/main" val="3151654204"/>
+      </p:ext>
+    </p:extLst>
+  </p:cSld>
+  <p:clrMapOvr>
+    <a:masterClrMapping/>
+  </p:clrMapOvr>
+</p:sld>
+</file>
+
+<file path=ppt/slides/slide7.xml><?xml version="1.0" encoding="utf-8"?>
+<p:sld xmlns:a="http://schemas.openxmlformats.org/drawingml/2006/main" xmlns:r="http://schemas.openxmlformats.org/officeDocument/2006/relationships" xmlns:p="http://schemas.openxmlformats.org/presentationml/2006/main">
+  <p:cSld>
+    <p:spTree>
+      <p:nvGrpSpPr>
+        <p:cNvPr id="1" name=""/>
+        <p:cNvGrpSpPr/>
+        <p:nvPr/>
+      </p:nvGrpSpPr>
+      <p:grpSpPr>
+        <a:xfrm>
+          <a:off x="0" y="0"/>
+          <a:ext cx="0" cy="0"/>
+          <a:chOff x="0" y="0"/>
+          <a:chExt cx="0" cy="0"/>
+        </a:xfrm>
+      </p:grpSpPr>
+      <p:sp>
+        <p:nvSpPr>
+          <p:cNvPr id="2" name="タイトル 1">
+            <a:extLst>
+              <a:ext uri="{FF2B5EF4-FFF2-40B4-BE49-F238E27FC236}">
+                <a16:creationId xmlns:a16="http://schemas.microsoft.com/office/drawing/2014/main" id="{65928DA4-E2F9-4254-A027-BEC4B93EA71A}"/>
+              </a:ext>
+            </a:extLst>
+          </p:cNvPr>
+          <p:cNvSpPr>
+            <a:spLocks noGrp="1"/>
+          </p:cNvSpPr>
+          <p:nvPr>
+            <p:ph type="title"/>
+          </p:nvPr>
+        </p:nvSpPr>
+        <p:spPr/>
+        <p:txBody>
+          <a:bodyPr/>
+          <a:lstStyle/>
+          <a:p>
+            <a:pPr algn="l"/>
+            <a:r>
+              <a:rPr kumimoji="1" lang="ja-JP" altLang="en-US" dirty="0"/>
+              <a:t>課題</a:t>
+            </a:r>
+          </a:p>
+        </p:txBody>
+      </p:sp>
+      <p:sp>
+        <p:nvSpPr>
+          <p:cNvPr id="3" name="コンテンツ プレースホルダー 2">
+            <a:extLst>
+              <a:ext uri="{FF2B5EF4-FFF2-40B4-BE49-F238E27FC236}">
+                <a16:creationId xmlns:a16="http://schemas.microsoft.com/office/drawing/2014/main" id="{CF0FCAEF-A757-402E-818D-3ECEAC5CFC0F}"/>
+              </a:ext>
+            </a:extLst>
+          </p:cNvPr>
+          <p:cNvSpPr>
+            <a:spLocks noGrp="1"/>
+          </p:cNvSpPr>
+          <p:nvPr>
+            <p:ph idx="1"/>
+          </p:nvPr>
+        </p:nvSpPr>
+        <p:spPr/>
+        <p:txBody>
+          <a:bodyPr/>
+          <a:lstStyle/>
+          <a:p>
+            <a:r>
+              <a:rPr kumimoji="1" lang="ja-JP" altLang="en-US" dirty="0"/>
+              <a:t>衝突平面に平行な移動成分を残して移動させることができなかった。</a:t>
+            </a:r>
+            <a:endParaRPr kumimoji="1" lang="en-US" altLang="ja-JP" dirty="0"/>
+          </a:p>
+          <a:p>
+            <a:r>
+              <a:rPr kumimoji="1" lang="ja-JP" altLang="en-US" dirty="0"/>
+              <a:t>テクスチャを実装できなかったのでプレイヤーへやさしくない</a:t>
+            </a:r>
+            <a:r>
+              <a:rPr kumimoji="1" lang="en-US" altLang="ja-JP" dirty="0"/>
+              <a:t>GUI</a:t>
+            </a:r>
+            <a:r>
+              <a:rPr kumimoji="1" lang="ja-JP" altLang="en-US" dirty="0"/>
+              <a:t>となってしまった。</a:t>
+            </a:r>
+            <a:endParaRPr kumimoji="1" lang="en-US" altLang="ja-JP" dirty="0"/>
+          </a:p>
+        </p:txBody>
+      </p:sp>
+    </p:spTree>
+    <p:extLst>
+      <p:ext uri="{BB962C8B-B14F-4D97-AF65-F5344CB8AC3E}">
+        <p14:creationId xmlns:p14="http://schemas.microsoft.com/office/powerpoint/2010/main" val="1939636537"/>
+      </p:ext>
+    </p:extLst>
+  </p:cSld>
+  <p:clrMapOvr>
+    <a:masterClrMapping/>
+  </p:clrMapOvr>
+</p:sld>
+</file>
+
+<file path=ppt/slides/slide8.xml><?xml version="1.0" encoding="utf-8"?>
+<p:sld xmlns:a="http://schemas.openxmlformats.org/drawingml/2006/main" xmlns:r="http://schemas.openxmlformats.org/officeDocument/2006/relationships" xmlns:p="http://schemas.openxmlformats.org/presentationml/2006/main">
+  <p:cSld>
+    <p:spTree>
+      <p:nvGrpSpPr>
+        <p:cNvPr id="1" name=""/>
+        <p:cNvGrpSpPr/>
+        <p:nvPr/>
+      </p:nvGrpSpPr>
+      <p:grpSpPr>
+        <a:xfrm>
+          <a:off x="0" y="0"/>
+          <a:ext cx="0" cy="0"/>
+          <a:chOff x="0" y="0"/>
+          <a:chExt cx="0" cy="0"/>
+        </a:xfrm>
+      </p:grpSpPr>
+      <p:sp>
+        <p:nvSpPr>
+          <p:cNvPr id="2" name="タイトル 1">
+            <a:extLst>
+              <a:ext uri="{FF2B5EF4-FFF2-40B4-BE49-F238E27FC236}">
+                <a16:creationId xmlns:a16="http://schemas.microsoft.com/office/drawing/2014/main" id="{D080ACB1-2B51-4F10-9705-39FE8C7B1D6A}"/>
+              </a:ext>
+            </a:extLst>
+          </p:cNvPr>
+          <p:cNvSpPr>
+            <a:spLocks noGrp="1"/>
+          </p:cNvSpPr>
+          <p:nvPr>
+            <p:ph type="title"/>
+          </p:nvPr>
+        </p:nvSpPr>
+        <p:spPr/>
+        <p:txBody>
+          <a:bodyPr/>
+          <a:lstStyle/>
+          <a:p>
+            <a:pPr algn="l"/>
+            <a:r>
+              <a:rPr kumimoji="1" lang="ja-JP" altLang="en-US" dirty="0"/>
+              <a:t>感想</a:t>
+            </a:r>
+          </a:p>
+        </p:txBody>
+      </p:sp>
+      <p:sp>
+        <p:nvSpPr>
+          <p:cNvPr id="3" name="コンテンツ プレースホルダー 2">
+            <a:extLst>
+              <a:ext uri="{FF2B5EF4-FFF2-40B4-BE49-F238E27FC236}">
+                <a16:creationId xmlns:a16="http://schemas.microsoft.com/office/drawing/2014/main" id="{50A4E784-4981-4BA2-B358-B5632C7BAF31}"/>
+              </a:ext>
+            </a:extLst>
+          </p:cNvPr>
+          <p:cNvSpPr>
+            <a:spLocks noGrp="1"/>
+          </p:cNvSpPr>
+          <p:nvPr>
+            <p:ph idx="1"/>
+          </p:nvPr>
+        </p:nvSpPr>
+        <p:spPr/>
+        <p:txBody>
+          <a:bodyPr/>
+          <a:lstStyle/>
+          <a:p>
+            <a:r>
+              <a:rPr kumimoji="1" lang="ja-JP" altLang="en-US" dirty="0"/>
+              <a:t>衝突検出は難しかった。</a:t>
+            </a:r>
+            <a:endParaRPr kumimoji="1" lang="en-US" altLang="ja-JP" dirty="0"/>
+          </a:p>
+          <a:p>
+            <a:r>
+              <a:rPr kumimoji="1" lang="en-US" altLang="ja-JP" dirty="0"/>
+              <a:t>OpenGL</a:t>
+            </a:r>
+            <a:r>
+              <a:rPr kumimoji="1" lang="ja-JP" altLang="en-US" dirty="0"/>
+              <a:t>は使いづらかった。</a:t>
+            </a:r>
+            <a:r>
+              <a:rPr kumimoji="1" lang="en-US" altLang="ja-JP" dirty="0"/>
+              <a:t>Unity</a:t>
+            </a:r>
+            <a:r>
+              <a:rPr kumimoji="1" lang="ja-JP" altLang="en-US" dirty="0"/>
+              <a:t>をやりたいと強く感じた。</a:t>
+            </a:r>
+          </a:p>
+        </p:txBody>
+      </p:sp>
+    </p:spTree>
+    <p:extLst>
+      <p:ext uri="{BB962C8B-B14F-4D97-AF65-F5344CB8AC3E}">
+        <p14:creationId xmlns:p14="http://schemas.microsoft.com/office/powerpoint/2010/main" val="1447385475"/>
       </p:ext>
     </p:extLst>
   </p:cSld>

</xml_diff>